<commit_message>
coloring of tracks from tracks file
</commit_message>
<xml_diff>
--- a/freehand_line.pptx
+++ b/freehand_line.pptx
@@ -104,6 +104,22 @@
       </a:defRPr>
     </a:lvl9pPr>
   </p:defaultTextStyle>
+  <p:extLst>
+    <p:ext uri="{EFAFB233-063F-42B5-8137-9DF3F51BA10A}">
+      <p15:sldGuideLst xmlns:p15="http://schemas.microsoft.com/office/powerpoint/2012/main">
+        <p15:guide id="1" orient="horz" pos="2160">
+          <p15:clr>
+            <a:srgbClr val="A4A3A4"/>
+          </p15:clr>
+        </p15:guide>
+        <p15:guide id="2" pos="2880">
+          <p15:clr>
+            <a:srgbClr val="A4A3A4"/>
+          </p15:clr>
+        </p15:guide>
+      </p15:sldGuideLst>
+    </p:ext>
+  </p:extLst>
 </p:presentation>
 </file>
 
@@ -288,7 +304,7 @@
           <a:p>
             <a:fld id="{07AF7C9C-3FFC-F543-8CD5-56B058077314}" type="datetimeFigureOut">
               <a:rPr lang="en-US" smtClean="0"/>
-              <a:t>16/06/18</a:t>
+              <a:t>6/17/18</a:t>
             </a:fld>
             <a:endParaRPr lang="en-US"/>
           </a:p>
@@ -458,7 +474,7 @@
           <a:p>
             <a:fld id="{07AF7C9C-3FFC-F543-8CD5-56B058077314}" type="datetimeFigureOut">
               <a:rPr lang="en-US" smtClean="0"/>
-              <a:t>16/06/18</a:t>
+              <a:t>6/17/18</a:t>
             </a:fld>
             <a:endParaRPr lang="en-US"/>
           </a:p>
@@ -638,7 +654,7 @@
           <a:p>
             <a:fld id="{07AF7C9C-3FFC-F543-8CD5-56B058077314}" type="datetimeFigureOut">
               <a:rPr lang="en-US" smtClean="0"/>
-              <a:t>16/06/18</a:t>
+              <a:t>6/17/18</a:t>
             </a:fld>
             <a:endParaRPr lang="en-US"/>
           </a:p>
@@ -808,7 +824,7 @@
           <a:p>
             <a:fld id="{07AF7C9C-3FFC-F543-8CD5-56B058077314}" type="datetimeFigureOut">
               <a:rPr lang="en-US" smtClean="0"/>
-              <a:t>16/06/18</a:t>
+              <a:t>6/17/18</a:t>
             </a:fld>
             <a:endParaRPr lang="en-US"/>
           </a:p>
@@ -1054,7 +1070,7 @@
           <a:p>
             <a:fld id="{07AF7C9C-3FFC-F543-8CD5-56B058077314}" type="datetimeFigureOut">
               <a:rPr lang="en-US" smtClean="0"/>
-              <a:t>16/06/18</a:t>
+              <a:t>6/17/18</a:t>
             </a:fld>
             <a:endParaRPr lang="en-US"/>
           </a:p>
@@ -1342,7 +1358,7 @@
           <a:p>
             <a:fld id="{07AF7C9C-3FFC-F543-8CD5-56B058077314}" type="datetimeFigureOut">
               <a:rPr lang="en-US" smtClean="0"/>
-              <a:t>16/06/18</a:t>
+              <a:t>6/17/18</a:t>
             </a:fld>
             <a:endParaRPr lang="en-US"/>
           </a:p>
@@ -1764,7 +1780,7 @@
           <a:p>
             <a:fld id="{07AF7C9C-3FFC-F543-8CD5-56B058077314}" type="datetimeFigureOut">
               <a:rPr lang="en-US" smtClean="0"/>
-              <a:t>16/06/18</a:t>
+              <a:t>6/17/18</a:t>
             </a:fld>
             <a:endParaRPr lang="en-US"/>
           </a:p>
@@ -1882,7 +1898,7 @@
           <a:p>
             <a:fld id="{07AF7C9C-3FFC-F543-8CD5-56B058077314}" type="datetimeFigureOut">
               <a:rPr lang="en-US" smtClean="0"/>
-              <a:t>16/06/18</a:t>
+              <a:t>6/17/18</a:t>
             </a:fld>
             <a:endParaRPr lang="en-US"/>
           </a:p>
@@ -1977,7 +1993,7 @@
           <a:p>
             <a:fld id="{07AF7C9C-3FFC-F543-8CD5-56B058077314}" type="datetimeFigureOut">
               <a:rPr lang="en-US" smtClean="0"/>
-              <a:t>16/06/18</a:t>
+              <a:t>6/17/18</a:t>
             </a:fld>
             <a:endParaRPr lang="en-US"/>
           </a:p>
@@ -2254,7 +2270,7 @@
           <a:p>
             <a:fld id="{07AF7C9C-3FFC-F543-8CD5-56B058077314}" type="datetimeFigureOut">
               <a:rPr lang="en-US" smtClean="0"/>
-              <a:t>16/06/18</a:t>
+              <a:t>6/17/18</a:t>
             </a:fld>
             <a:endParaRPr lang="en-US"/>
           </a:p>
@@ -2507,7 +2523,7 @@
           <a:p>
             <a:fld id="{07AF7C9C-3FFC-F543-8CD5-56B058077314}" type="datetimeFigureOut">
               <a:rPr lang="en-US" smtClean="0"/>
-              <a:t>16/06/18</a:t>
+              <a:t>6/17/18</a:t>
             </a:fld>
             <a:endParaRPr lang="en-US"/>
           </a:p>
@@ -2720,7 +2736,7 @@
           <a:p>
             <a:fld id="{07AF7C9C-3FFC-F543-8CD5-56B058077314}" type="datetimeFigureOut">
               <a:rPr lang="en-US" smtClean="0"/>
-              <a:t>16/06/18</a:t>
+              <a:t>6/17/18</a:t>
             </a:fld>
             <a:endParaRPr lang="en-US"/>
           </a:p>
@@ -3203,8 +3219,7 @@
               <a:gd name="connsiteY45" fmla="*/ 506233 h 1696772"/>
             </a:gdLst>
             <a:ahLst/>
-            <a:cxnLst>
-						</a:cxnLst>
+            <a:cxnLst/>
             <a:rect l="l" t="t" r="r" b="b"/>
             <a:pathLst>
               <a:path w="1478320" h="1696772">
@@ -3220,6 +3235,11 @@
               </a:path>
             </a:pathLst>
           </a:custGeom>
+          <a:ln>
+            <a:solidFill>
+              <a:srgbClr val="FFFF00"/>
+            </a:solidFill>
+          </a:ln>
         </p:spPr>
         <p:style>
           <a:lnRef idx="2">
@@ -3257,7 +3277,7 @@
   <p:timing>
     <p:tnLst>
       <p:par>
-        <p:cTn xmlns:p14="http://schemas.microsoft.com/office/powerpoint/2010/main" id="1" dur="indefinite" restart="never" nodeType="tmRoot"/>
+        <p:cTn id="1" dur="indefinite" restart="never" nodeType="tmRoot"/>
       </p:par>
     </p:tnLst>
   </p:timing>

</xml_diff>